<commit_message>
Fixes in problem descriptions
</commit_message>
<xml_diff>
--- a/Courses/Software-Sciences/Module-2-DS-and-Algo/01.1-Arrays-Basics/01.1-Arrays-Basics.pptx
+++ b/Courses/Software-Sciences/Module-2-DS-and-Algo/01.1-Arrays-Basics/01.1-Arrays-Basics.pptx
@@ -301,7 +301,7 @@
           <a:p>
             <a:fld id="{4E087215-0C8F-4762-A664-737A353EC9A4}" type="datetimeFigureOut">
               <a:rPr lang="bg-BG" smtClean="0"/>
-              <a:t>25.06.24 г.</a:t>
+              <a:t>29.06.24 г.</a:t>
             </a:fld>
             <a:endParaRPr lang="bg-BG"/>
           </a:p>
@@ -497,7 +497,7 @@
           <a:p>
             <a:fld id="{72D84649-876A-46C9-8472-14CB09C070D8}" type="datetimeFigureOut">
               <a:rPr lang="en-US" smtClean="0"/>
-              <a:t>6/25/24</a:t>
+              <a:t>6/29/24</a:t>
             </a:fld>
             <a:endParaRPr lang="en-US"/>
           </a:p>
@@ -11315,7 +11315,7 @@
                 <a:latin typeface="Consolas" panose="020B0609020204030204" pitchFamily="49" charset="0"/>
                 <a:cs typeface="Consolas" panose="020B0609020204030204" pitchFamily="49" charset="0"/>
               </a:rPr>
-              <a:t>for-цикъл</a:t>
+              <a:t>foreach-цикъл</a:t>
             </a:r>
             <a:r>
               <a:rPr lang="en-US" sz="3600" dirty="0"/>
@@ -11655,7 +11655,7 @@
         <p:spPr bwMode="auto">
           <a:xfrm>
             <a:off x="765820" y="1844824"/>
-            <a:ext cx="6789007" cy="1633882"/>
+            <a:ext cx="6789007" cy="1633497"/>
           </a:xfrm>
           <a:prstGeom prst="rect">
             <a:avLst/>
@@ -11706,7 +11706,7 @@
               <a:rPr lang="nn-NO" sz="2399" b="1" noProof="1">
                 <a:latin typeface="Consolas" pitchFamily="49" charset="0"/>
               </a:rPr>
-              <a:t>for (int i = 0; i &lt; arr.Length; i++) {</a:t>
+              <a:t>foreach (int num in arr) {</a:t>
             </a:r>
           </a:p>
           <a:p>
@@ -11728,7 +11728,7 @@
               <a:rPr lang="nn-NO" sz="2399" b="1" noProof="1">
                 <a:latin typeface="Consolas" pitchFamily="49" charset="0"/>
               </a:rPr>
-              <a:t>Console.WriteLine(arr[i]); }</a:t>
+              <a:t>Console.WriteLine(num); }</a:t>
             </a:r>
             <a:endParaRPr lang="en-US" sz="2399" b="1" noProof="1">
               <a:latin typeface="Consolas" pitchFamily="49" charset="0"/>
@@ -22185,11 +22185,11 @@
   <p:clrMapOvr>
     <a:masterClrMapping/>
   </p:clrMapOvr>
-  <mc:AlternateContent xmlns:mc="http://schemas.openxmlformats.org/markup-compatibility/2006">
-    <mc:Choice xmlns:p14="http://schemas.microsoft.com/office/powerpoint/2010/main" Requires="p14">
+  <mc:AlternateContent xmlns:mc="http://schemas.openxmlformats.org/markup-compatibility/2006" xmlns:p14="http://schemas.microsoft.com/office/powerpoint/2010/main">
+    <mc:Choice Requires="p14">
       <p:transition spd="slow" p14:dur="2000" advClick="0" advTm="5000"/>
     </mc:Choice>
-    <mc:Fallback>
+    <mc:Fallback xmlns="">
       <p:transition spd="slow" advClick="0" advTm="5000"/>
     </mc:Fallback>
   </mc:AlternateContent>

</xml_diff>